<commit_message>
Converted the node.js file into async/await format
</commit_message>
<xml_diff>
--- a/data/PPT Reader Sample.pptx
+++ b/data/PPT Reader Sample.pptx
@@ -7,6 +7,7 @@
   <p:sldIdLst>
     <p:sldId id="256" r:id="rId2"/>
     <p:sldId id="257" r:id="rId3"/>
+    <p:sldId id="258" r:id="rId4"/>
   </p:sldIdLst>
   <p:sldSz cx="12192000" cy="6858000"/>
   <p:notesSz cx="6858000" cy="9144000"/>
@@ -3666,10 +3667,9 @@
                     <a:lstStyle/>
                     <a:p>
                       <a:r>
-                        <a:rPr lang="en-US"/>
+                        <a:rPr lang="en-US" dirty="0"/>
                         <a:t>ABC</a:t>
                       </a:r>
-                      <a:endParaRPr lang="en-US" dirty="0"/>
                     </a:p>
                   </a:txBody>
                   <a:tcPr/>
@@ -3727,6 +3727,304 @@
     <p:extLst>
       <p:ext uri="{BB962C8B-B14F-4D97-AF65-F5344CB8AC3E}">
         <p14:creationId xmlns:p14="http://schemas.microsoft.com/office/powerpoint/2010/main" val="3119829743"/>
+      </p:ext>
+    </p:extLst>
+  </p:cSld>
+  <p:clrMapOvr>
+    <a:masterClrMapping/>
+  </p:clrMapOvr>
+</p:sld>
+</file>
+
+<file path=ppt/slides/slide3.xml><?xml version="1.0" encoding="utf-8"?>
+<p:sld xmlns:a="http://schemas.openxmlformats.org/drawingml/2006/main" xmlns:r="http://schemas.openxmlformats.org/officeDocument/2006/relationships" xmlns:p="http://schemas.openxmlformats.org/presentationml/2006/main">
+  <p:cSld>
+    <p:spTree>
+      <p:nvGrpSpPr>
+        <p:cNvPr id="1" name=""/>
+        <p:cNvGrpSpPr/>
+        <p:nvPr/>
+      </p:nvGrpSpPr>
+      <p:grpSpPr>
+        <a:xfrm>
+          <a:off x="0" y="0"/>
+          <a:ext cx="0" cy="0"/>
+          <a:chOff x="0" y="0"/>
+          <a:chExt cx="0" cy="0"/>
+        </a:xfrm>
+      </p:grpSpPr>
+      <p:sp>
+        <p:nvSpPr>
+          <p:cNvPr id="2" name="Title 1">
+            <a:extLst>
+              <a:ext uri="{FF2B5EF4-FFF2-40B4-BE49-F238E27FC236}">
+                <a16:creationId xmlns:a16="http://schemas.microsoft.com/office/drawing/2014/main" id="{B2D23D9D-9EEA-8D54-ACA4-FF860B8CF519}"/>
+              </a:ext>
+            </a:extLst>
+          </p:cNvPr>
+          <p:cNvSpPr>
+            <a:spLocks noGrp="1"/>
+          </p:cNvSpPr>
+          <p:nvPr>
+            <p:ph type="title"/>
+          </p:nvPr>
+        </p:nvSpPr>
+        <p:spPr/>
+        <p:txBody>
+          <a:bodyPr/>
+          <a:lstStyle/>
+          <a:p>
+            <a:endParaRPr lang="en-US"/>
+          </a:p>
+        </p:txBody>
+      </p:sp>
+      <p:graphicFrame>
+        <p:nvGraphicFramePr>
+          <p:cNvPr id="4" name="Table 4">
+            <a:extLst>
+              <a:ext uri="{FF2B5EF4-FFF2-40B4-BE49-F238E27FC236}">
+                <a16:creationId xmlns:a16="http://schemas.microsoft.com/office/drawing/2014/main" id="{44428EBC-BDF8-F52C-B06E-DF661AA40C77}"/>
+              </a:ext>
+            </a:extLst>
+          </p:cNvPr>
+          <p:cNvGraphicFramePr>
+            <a:graphicFrameLocks noGrp="1"/>
+          </p:cNvGraphicFramePr>
+          <p:nvPr>
+            <p:ph idx="1"/>
+            <p:extLst>
+              <p:ext uri="{D42A27DB-BD31-4B8C-83A1-F6EECF244321}">
+                <p14:modId xmlns:p14="http://schemas.microsoft.com/office/powerpoint/2010/main" val="126835716"/>
+              </p:ext>
+            </p:extLst>
+          </p:nvPr>
+        </p:nvGraphicFramePr>
+        <p:xfrm>
+          <a:off x="838200" y="1825625"/>
+          <a:ext cx="10515597" cy="1483360"/>
+        </p:xfrm>
+        <a:graphic>
+          <a:graphicData uri="http://schemas.openxmlformats.org/drawingml/2006/table">
+            <a:tbl>
+              <a:tblPr firstRow="1" bandRow="1">
+                <a:tableStyleId>{5C22544A-7EE6-4342-B048-85BDC9FD1C3A}</a:tableStyleId>
+              </a:tblPr>
+              <a:tblGrid>
+                <a:gridCol w="3505199">
+                  <a:extLst>
+                    <a:ext uri="{9D8B030D-6E8A-4147-A177-3AD203B41FA5}">
+                      <a16:colId xmlns:a16="http://schemas.microsoft.com/office/drawing/2014/main" val="2416497791"/>
+                    </a:ext>
+                  </a:extLst>
+                </a:gridCol>
+                <a:gridCol w="3505199">
+                  <a:extLst>
+                    <a:ext uri="{9D8B030D-6E8A-4147-A177-3AD203B41FA5}">
+                      <a16:colId xmlns:a16="http://schemas.microsoft.com/office/drawing/2014/main" val="2126578512"/>
+                    </a:ext>
+                  </a:extLst>
+                </a:gridCol>
+                <a:gridCol w="3505199">
+                  <a:extLst>
+                    <a:ext uri="{9D8B030D-6E8A-4147-A177-3AD203B41FA5}">
+                      <a16:colId xmlns:a16="http://schemas.microsoft.com/office/drawing/2014/main" val="2534576053"/>
+                    </a:ext>
+                  </a:extLst>
+                </a:gridCol>
+              </a:tblGrid>
+              <a:tr h="370840">
+                <a:tc>
+                  <a:txBody>
+                    <a:bodyPr/>
+                    <a:lstStyle/>
+                    <a:p>
+                      <a:r>
+                        <a:rPr lang="en-US" dirty="0"/>
+                        <a:t>Name</a:t>
+                      </a:r>
+                    </a:p>
+                  </a:txBody>
+                  <a:tcPr/>
+                </a:tc>
+                <a:tc>
+                  <a:txBody>
+                    <a:bodyPr/>
+                    <a:lstStyle/>
+                    <a:p>
+                      <a:r>
+                        <a:rPr lang="en-US" dirty="0"/>
+                        <a:t>State</a:t>
+                      </a:r>
+                    </a:p>
+                  </a:txBody>
+                  <a:tcPr/>
+                </a:tc>
+                <a:tc>
+                  <a:txBody>
+                    <a:bodyPr/>
+                    <a:lstStyle/>
+                    <a:p>
+                      <a:r>
+                        <a:rPr lang="en-US" dirty="0"/>
+                        <a:t>City</a:t>
+                      </a:r>
+                    </a:p>
+                  </a:txBody>
+                  <a:tcPr/>
+                </a:tc>
+                <a:extLst>
+                  <a:ext uri="{0D108BD9-81ED-4DB2-BD59-A6C34878D82A}">
+                    <a16:rowId xmlns:a16="http://schemas.microsoft.com/office/drawing/2014/main" val="1576158307"/>
+                  </a:ext>
+                </a:extLst>
+              </a:tr>
+              <a:tr h="370840">
+                <a:tc>
+                  <a:txBody>
+                    <a:bodyPr/>
+                    <a:lstStyle/>
+                    <a:p>
+                      <a:r>
+                        <a:rPr lang="en-US" dirty="0"/>
+                        <a:t>ABC</a:t>
+                      </a:r>
+                    </a:p>
+                  </a:txBody>
+                  <a:tcPr/>
+                </a:tc>
+                <a:tc>
+                  <a:txBody>
+                    <a:bodyPr/>
+                    <a:lstStyle/>
+                    <a:p>
+                      <a:r>
+                        <a:rPr lang="en-US" dirty="0"/>
+                        <a:t>MH</a:t>
+                      </a:r>
+                    </a:p>
+                  </a:txBody>
+                  <a:tcPr/>
+                </a:tc>
+                <a:tc>
+                  <a:txBody>
+                    <a:bodyPr/>
+                    <a:lstStyle/>
+                    <a:p>
+                      <a:r>
+                        <a:rPr lang="en-US" dirty="0"/>
+                        <a:t>Mumbai</a:t>
+                      </a:r>
+                    </a:p>
+                  </a:txBody>
+                  <a:tcPr/>
+                </a:tc>
+                <a:extLst>
+                  <a:ext uri="{0D108BD9-81ED-4DB2-BD59-A6C34878D82A}">
+                    <a16:rowId xmlns:a16="http://schemas.microsoft.com/office/drawing/2014/main" val="1439577444"/>
+                  </a:ext>
+                </a:extLst>
+              </a:tr>
+              <a:tr h="370840">
+                <a:tc>
+                  <a:txBody>
+                    <a:bodyPr/>
+                    <a:lstStyle/>
+                    <a:p>
+                      <a:r>
+                        <a:rPr lang="en-US" dirty="0"/>
+                        <a:t>XYZ</a:t>
+                      </a:r>
+                    </a:p>
+                  </a:txBody>
+                  <a:tcPr/>
+                </a:tc>
+                <a:tc>
+                  <a:txBody>
+                    <a:bodyPr/>
+                    <a:lstStyle/>
+                    <a:p>
+                      <a:r>
+                        <a:rPr lang="en-US" dirty="0"/>
+                        <a:t>OD</a:t>
+                      </a:r>
+                    </a:p>
+                  </a:txBody>
+                  <a:tcPr/>
+                </a:tc>
+                <a:tc>
+                  <a:txBody>
+                    <a:bodyPr/>
+                    <a:lstStyle/>
+                    <a:p>
+                      <a:r>
+                        <a:rPr lang="en-US" dirty="0"/>
+                        <a:t>Bhubaneswar</a:t>
+                      </a:r>
+                    </a:p>
+                  </a:txBody>
+                  <a:tcPr/>
+                </a:tc>
+                <a:extLst>
+                  <a:ext uri="{0D108BD9-81ED-4DB2-BD59-A6C34878D82A}">
+                    <a16:rowId xmlns:a16="http://schemas.microsoft.com/office/drawing/2014/main" val="4196209292"/>
+                  </a:ext>
+                </a:extLst>
+              </a:tr>
+              <a:tr h="370840">
+                <a:tc>
+                  <a:txBody>
+                    <a:bodyPr/>
+                    <a:lstStyle/>
+                    <a:p>
+                      <a:r>
+                        <a:rPr lang="en-US" dirty="0"/>
+                        <a:t>CDE</a:t>
+                      </a:r>
+                    </a:p>
+                  </a:txBody>
+                  <a:tcPr/>
+                </a:tc>
+                <a:tc>
+                  <a:txBody>
+                    <a:bodyPr/>
+                    <a:lstStyle/>
+                    <a:p>
+                      <a:r>
+                        <a:rPr lang="en-US" dirty="0"/>
+                        <a:t>KA</a:t>
+                      </a:r>
+                    </a:p>
+                  </a:txBody>
+                  <a:tcPr/>
+                </a:tc>
+                <a:tc>
+                  <a:txBody>
+                    <a:bodyPr/>
+                    <a:lstStyle/>
+                    <a:p>
+                      <a:r>
+                        <a:rPr lang="en-US"/>
+                        <a:t>Bangalore</a:t>
+                      </a:r>
+                      <a:endParaRPr lang="en-US" dirty="0"/>
+                    </a:p>
+                  </a:txBody>
+                  <a:tcPr/>
+                </a:tc>
+                <a:extLst>
+                  <a:ext uri="{0D108BD9-81ED-4DB2-BD59-A6C34878D82A}">
+                    <a16:rowId xmlns:a16="http://schemas.microsoft.com/office/drawing/2014/main" val="340687224"/>
+                  </a:ext>
+                </a:extLst>
+              </a:tr>
+            </a:tbl>
+          </a:graphicData>
+        </a:graphic>
+      </p:graphicFrame>
+    </p:spTree>
+    <p:extLst>
+      <p:ext uri="{BB962C8B-B14F-4D97-AF65-F5344CB8AC3E}">
+        <p14:creationId xmlns:p14="http://schemas.microsoft.com/office/powerpoint/2010/main" val="900541850"/>
       </p:ext>
     </p:extLst>
   </p:cSld>

</xml_diff>